<commit_message>
some small bug fixes
</commit_message>
<xml_diff>
--- a/classes/stats2018/Lecture03.pptx
+++ b/classes/stats2018/Lecture03.pptx
@@ -257,7 +257,7 @@
             <a:fld id="{70778D97-C3FD-45B9-9D4E-C62E122BCE58}" type="datetimeFigureOut">
               <a:rPr lang="en-US" smtClean="0"/>
               <a:pPr/>
-              <a:t>1/19/2017</a:t>
+              <a:t>1/24/2018</a:t>
             </a:fld>
             <a:endParaRPr lang="en-US"/>
           </a:p>
@@ -2914,7 +2914,7 @@
             <a:fld id="{1D8BD707-D9CF-40AE-B4C6-C98DA3205C09}" type="datetimeFigureOut">
               <a:rPr lang="en-US" smtClean="0"/>
               <a:pPr/>
-              <a:t>1/19/2017</a:t>
+              <a:t>1/24/2018</a:t>
             </a:fld>
             <a:endParaRPr lang="en-US"/>
           </a:p>
@@ -3079,7 +3079,7 @@
             <a:fld id="{1D8BD707-D9CF-40AE-B4C6-C98DA3205C09}" type="datetimeFigureOut">
               <a:rPr lang="en-US" smtClean="0"/>
               <a:pPr/>
-              <a:t>1/19/2017</a:t>
+              <a:t>1/24/2018</a:t>
             </a:fld>
             <a:endParaRPr lang="en-US"/>
           </a:p>
@@ -3254,7 +3254,7 @@
             <a:fld id="{1D8BD707-D9CF-40AE-B4C6-C98DA3205C09}" type="datetimeFigureOut">
               <a:rPr lang="en-US" smtClean="0"/>
               <a:pPr/>
-              <a:t>1/19/2017</a:t>
+              <a:t>1/24/2018</a:t>
             </a:fld>
             <a:endParaRPr lang="en-US"/>
           </a:p>
@@ -3419,7 +3419,7 @@
             <a:fld id="{1D8BD707-D9CF-40AE-B4C6-C98DA3205C09}" type="datetimeFigureOut">
               <a:rPr lang="en-US" smtClean="0"/>
               <a:pPr/>
-              <a:t>1/19/2017</a:t>
+              <a:t>1/24/2018</a:t>
             </a:fld>
             <a:endParaRPr lang="en-US"/>
           </a:p>
@@ -3661,7 +3661,7 @@
             <a:fld id="{1D8BD707-D9CF-40AE-B4C6-C98DA3205C09}" type="datetimeFigureOut">
               <a:rPr lang="en-US" smtClean="0"/>
               <a:pPr/>
-              <a:t>1/19/2017</a:t>
+              <a:t>1/24/2018</a:t>
             </a:fld>
             <a:endParaRPr lang="en-US"/>
           </a:p>
@@ -3943,7 +3943,7 @@
             <a:fld id="{1D8BD707-D9CF-40AE-B4C6-C98DA3205C09}" type="datetimeFigureOut">
               <a:rPr lang="en-US" smtClean="0"/>
               <a:pPr/>
-              <a:t>1/19/2017</a:t>
+              <a:t>1/24/2018</a:t>
             </a:fld>
             <a:endParaRPr lang="en-US"/>
           </a:p>
@@ -4359,7 +4359,7 @@
             <a:fld id="{1D8BD707-D9CF-40AE-B4C6-C98DA3205C09}" type="datetimeFigureOut">
               <a:rPr lang="en-US" smtClean="0"/>
               <a:pPr/>
-              <a:t>1/19/2017</a:t>
+              <a:t>1/24/2018</a:t>
             </a:fld>
             <a:endParaRPr lang="en-US"/>
           </a:p>
@@ -4473,7 +4473,7 @@
             <a:fld id="{1D8BD707-D9CF-40AE-B4C6-C98DA3205C09}" type="datetimeFigureOut">
               <a:rPr lang="en-US" smtClean="0"/>
               <a:pPr/>
-              <a:t>1/19/2017</a:t>
+              <a:t>1/24/2018</a:t>
             </a:fld>
             <a:endParaRPr lang="en-US"/>
           </a:p>
@@ -4565,7 +4565,7 @@
             <a:fld id="{1D8BD707-D9CF-40AE-B4C6-C98DA3205C09}" type="datetimeFigureOut">
               <a:rPr lang="en-US" smtClean="0"/>
               <a:pPr/>
-              <a:t>1/19/2017</a:t>
+              <a:t>1/24/2018</a:t>
             </a:fld>
             <a:endParaRPr lang="en-US"/>
           </a:p>
@@ -4837,7 +4837,7 @@
             <a:fld id="{1D8BD707-D9CF-40AE-B4C6-C98DA3205C09}" type="datetimeFigureOut">
               <a:rPr lang="en-US" smtClean="0"/>
               <a:pPr/>
-              <a:t>1/19/2017</a:t>
+              <a:t>1/24/2018</a:t>
             </a:fld>
             <a:endParaRPr lang="en-US"/>
           </a:p>
@@ -5086,7 +5086,7 @@
             <a:fld id="{1D8BD707-D9CF-40AE-B4C6-C98DA3205C09}" type="datetimeFigureOut">
               <a:rPr lang="en-US" smtClean="0"/>
               <a:pPr/>
-              <a:t>1/19/2017</a:t>
+              <a:t>1/24/2018</a:t>
             </a:fld>
             <a:endParaRPr lang="en-US"/>
           </a:p>
@@ -5294,7 +5294,7 @@
             <a:fld id="{1D8BD707-D9CF-40AE-B4C6-C98DA3205C09}" type="datetimeFigureOut">
               <a:rPr lang="en-US" smtClean="0"/>
               <a:pPr/>
-              <a:t>1/19/2017</a:t>
+              <a:t>1/24/2018</a:t>
             </a:fld>
             <a:endParaRPr lang="en-US"/>
           </a:p>
@@ -5689,7 +5689,7 @@
           <a:p>
             <a:r>
               <a:rPr lang="en-US" dirty="0"/>
-              <a:t>Mean and value of continuous distributions</a:t>
+              <a:t>Mean and variance of continuous distributions</a:t>
             </a:r>
           </a:p>
           <a:p>
@@ -5762,7 +5762,7 @@
         </p:nvCxnSpPr>
         <p:spPr>
           <a:xfrm rot="10800000">
-            <a:off x="4495800" y="457200"/>
+            <a:off x="4800600" y="531812"/>
             <a:ext cx="609600" cy="1588"/>
           </a:xfrm>
           <a:prstGeom prst="straightConnector1">
@@ -7601,7 +7601,7 @@
         <p:spPr bwMode="auto">
           <a:xfrm>
             <a:off x="3563938" y="6172200"/>
-            <a:ext cx="1236662" cy="461963"/>
+            <a:ext cx="973343" cy="369332"/>
           </a:xfrm>
           <a:prstGeom prst="rect">
             <a:avLst/>
@@ -7621,10 +7621,10 @@
           <a:lstStyle/>
           <a:p>
             <a:r>
-              <a:rPr lang="en-US">
+              <a:rPr lang="en-US" dirty="0">
                 <a:latin typeface="Times New Roman" pitchFamily="18" charset="0"/>
               </a:rPr>
-              <a:t>k! (n-k!)</a:t>
+              <a:t>k! (n-k)!</a:t>
             </a:r>
           </a:p>
         </p:txBody>
@@ -11827,7 +11827,7 @@
           <a:graphicData uri="http://schemas.openxmlformats.org/presentationml/2006/ole">
             <mc:AlternateContent xmlns:mc="http://schemas.openxmlformats.org/markup-compatibility/2006">
               <mc:Choice xmlns:v="urn:schemas-microsoft-com:vml" Requires="v">
-                <p:oleObj spid="_x0000_s133148" name="Bitmap Image" r:id="rId4" imgW="9771429" imgH="6973273" progId="PBrush">
+                <p:oleObj spid="_x0000_s133154" name="Bitmap Image" r:id="rId4" imgW="9771429" imgH="6973273" progId="PBrush">
                   <p:embed/>
                 </p:oleObj>
               </mc:Choice>
@@ -11992,7 +11992,7 @@
           <a:graphicData uri="http://schemas.openxmlformats.org/presentationml/2006/ole">
             <mc:AlternateContent xmlns:mc="http://schemas.openxmlformats.org/markup-compatibility/2006">
               <mc:Choice xmlns:v="urn:schemas-microsoft-com:vml" Requires="v">
-                <p:oleObj spid="_x0000_s134172" name="Bitmap Image" r:id="rId4" imgW="7857143" imgH="4667902" progId="PBrush">
+                <p:oleObj spid="_x0000_s134178" name="Bitmap Image" r:id="rId4" imgW="7857143" imgH="4667902" progId="PBrush">
                   <p:embed/>
                 </p:oleObj>
               </mc:Choice>
@@ -12162,7 +12162,7 @@
           <a:graphicData uri="http://schemas.openxmlformats.org/presentationml/2006/ole">
             <mc:AlternateContent xmlns:mc="http://schemas.openxmlformats.org/markup-compatibility/2006">
               <mc:Choice xmlns:v="urn:schemas-microsoft-com:vml" Requires="v">
-                <p:oleObj spid="_x0000_s135196" name="Bitmap Image" r:id="rId4" imgW="8411749" imgH="1752381" progId="PBrush">
+                <p:oleObj spid="_x0000_s135202" name="Bitmap Image" r:id="rId4" imgW="8411749" imgH="1752381" progId="PBrush">
                   <p:embed/>
                 </p:oleObj>
               </mc:Choice>
@@ -14126,7 +14126,7 @@
           <a:graphicData uri="http://schemas.openxmlformats.org/presentationml/2006/ole">
             <mc:AlternateContent xmlns:mc="http://schemas.openxmlformats.org/markup-compatibility/2006">
               <mc:Choice xmlns:v="urn:schemas-microsoft-com:vml" Requires="v">
-                <p:oleObj spid="_x0000_s136220" name="Bitmap Image" r:id="rId4" imgW="7516274" imgH="2933333" progId="PBrush">
+                <p:oleObj spid="_x0000_s136226" name="Bitmap Image" r:id="rId4" imgW="7516274" imgH="2933333" progId="PBrush">
                   <p:embed/>
                 </p:oleObj>
               </mc:Choice>
@@ -14847,7 +14847,7 @@
           <a:graphicData uri="http://schemas.openxmlformats.org/presentationml/2006/ole">
             <mc:AlternateContent xmlns:mc="http://schemas.openxmlformats.org/markup-compatibility/2006">
               <mc:Choice xmlns:v="urn:schemas-microsoft-com:vml" Requires="v">
-                <p:oleObj spid="_x0000_s137244" name="Bitmap Image" r:id="rId4" imgW="9888330" imgH="6838095" progId="PBrush">
+                <p:oleObj spid="_x0000_s137250" name="Bitmap Image" r:id="rId4" imgW="9888330" imgH="6838095" progId="PBrush">
                   <p:embed/>
                 </p:oleObj>
               </mc:Choice>
@@ -18309,7 +18309,7 @@
           <a:graphicData uri="http://schemas.openxmlformats.org/presentationml/2006/ole">
             <mc:AlternateContent xmlns:mc="http://schemas.openxmlformats.org/markup-compatibility/2006">
               <mc:Choice xmlns:v="urn:schemas-microsoft-com:vml" Requires="v">
-                <p:oleObj spid="_x0000_s138268" name="Bitmap Image" r:id="rId4" imgW="5877745" imgH="2123810" progId="PBrush">
+                <p:oleObj spid="_x0000_s138274" name="Bitmap Image" r:id="rId4" imgW="5877745" imgH="2123810" progId="PBrush">
                   <p:embed/>
                 </p:oleObj>
               </mc:Choice>
@@ -18809,7 +18809,7 @@
           <a:graphicData uri="http://schemas.openxmlformats.org/presentationml/2006/ole">
             <mc:AlternateContent xmlns:mc="http://schemas.openxmlformats.org/markup-compatibility/2006">
               <mc:Choice xmlns:v="urn:schemas-microsoft-com:vml" Requires="v">
-                <p:oleObj spid="_x0000_s139292" name="Bitmap Image" r:id="rId4" imgW="7923810" imgH="5304762" progId="PBrush">
+                <p:oleObj spid="_x0000_s139298" name="Bitmap Image" r:id="rId4" imgW="7923810" imgH="5304762" progId="PBrush">
                   <p:embed/>
                 </p:oleObj>
               </mc:Choice>
@@ -19329,7 +19329,7 @@
           <a:graphicData uri="http://schemas.openxmlformats.org/presentationml/2006/ole">
             <mc:AlternateContent xmlns:mc="http://schemas.openxmlformats.org/markup-compatibility/2006">
               <mc:Choice xmlns:v="urn:schemas-microsoft-com:vml" Requires="v">
-                <p:oleObj spid="_x0000_s140342" name="Bitmap Image" r:id="rId4" imgW="5742857" imgH="1914286" progId="PBrush">
+                <p:oleObj spid="_x0000_s140354" name="Bitmap Image" r:id="rId4" imgW="5742857" imgH="1914286" progId="PBrush">
                   <p:embed/>
                 </p:oleObj>
               </mc:Choice>
@@ -19422,7 +19422,7 @@
           <a:graphicData uri="http://schemas.openxmlformats.org/presentationml/2006/ole">
             <mc:AlternateContent xmlns:mc="http://schemas.openxmlformats.org/markup-compatibility/2006">
               <mc:Choice xmlns:v="urn:schemas-microsoft-com:vml" Requires="v">
-                <p:oleObj spid="_x0000_s140343" name="Bitmap Image" r:id="rId6" imgW="5904762" imgH="1914286" progId="PBrush">
+                <p:oleObj spid="_x0000_s140355" name="Bitmap Image" r:id="rId6" imgW="5904762" imgH="1914286" progId="PBrush">
                   <p:embed/>
                 </p:oleObj>
               </mc:Choice>
@@ -22941,7 +22941,7 @@
       </p:pic>
       <p:pic>
         <p:nvPicPr>
-          <p:cNvPr id="59395" name="Picture 3"/>
+          <p:cNvPr id="59396" name="Picture 4"/>
           <p:cNvPicPr>
             <a:picLocks noChangeAspect="1" noChangeArrowheads="1"/>
           </p:cNvPicPr>
@@ -22956,8 +22956,8 @@
         </p:blipFill>
         <p:spPr bwMode="auto">
           <a:xfrm>
-            <a:off x="1166813" y="2286000"/>
-            <a:ext cx="6810375" cy="771525"/>
+            <a:off x="914400" y="3276600"/>
+            <a:ext cx="5724525" cy="1362075"/>
           </a:xfrm>
           <a:prstGeom prst="rect">
             <a:avLst/>
@@ -22973,34 +22973,32 @@
       </p:pic>
       <p:pic>
         <p:nvPicPr>
-          <p:cNvPr id="59396" name="Picture 4"/>
+          <p:cNvPr id="2" name="Picture 1">
+            <a:extLst>
+              <a:ext uri="{FF2B5EF4-FFF2-40B4-BE49-F238E27FC236}">
+                <a16:creationId xmlns:a16="http://schemas.microsoft.com/office/drawing/2014/main" id="{EF0D8FA2-3352-4C0F-A070-8422AAFA30FD}"/>
+              </a:ext>
+            </a:extLst>
+          </p:cNvPr>
           <p:cNvPicPr>
-            <a:picLocks noChangeAspect="1" noChangeArrowheads="1"/>
+            <a:picLocks noChangeAspect="1"/>
           </p:cNvPicPr>
           <p:nvPr/>
         </p:nvPicPr>
         <p:blipFill>
-          <a:blip r:embed="rId4" cstate="print"/>
-          <a:srcRect/>
+          <a:blip r:embed="rId4"/>
           <a:stretch>
             <a:fillRect/>
           </a:stretch>
         </p:blipFill>
-        <p:spPr bwMode="auto">
-          <a:xfrm>
-            <a:off x="914400" y="3276600"/>
-            <a:ext cx="5724525" cy="1362075"/>
-          </a:xfrm>
-          <a:prstGeom prst="rect">
-            <a:avLst/>
-          </a:prstGeom>
-          <a:noFill/>
-          <a:ln w="9525">
-            <a:noFill/>
-            <a:miter lim="800000"/>
-            <a:headEnd/>
-            <a:tailEnd/>
-          </a:ln>
+        <p:spPr>
+          <a:xfrm>
+            <a:off x="228600" y="2188607"/>
+            <a:ext cx="8382000" cy="1024898"/>
+          </a:xfrm>
+          <a:prstGeom prst="rect">
+            <a:avLst/>
+          </a:prstGeom>
         </p:spPr>
       </p:pic>
     </p:spTree>

</xml_diff>